<commit_message>
plots for registeration on all axis
</commit_message>
<xml_diff>
--- a/Maximum Distance Gradient for Robust Image Registration.pptx
+++ b/Maximum Distance Gradient for Robust Image Registration.pptx
@@ -135,10 +135,6 @@
 </p:presentation>
 </file>
 
-<file path=ppt/revisionInfo.xml><?xml version="1.0" encoding="utf-8"?>
-<p1510:revInfo xmlns:a="http://schemas.openxmlformats.org/drawingml/2006/main" xmlns:r="http://schemas.openxmlformats.org/officeDocument/2006/relationships" xmlns:p1510="http://schemas.microsoft.com/office/powerpoint/2015/10/main"/>
-</file>
-
 <file path=ppt/notesMasters/notesMaster1.xml><?xml version="1.0" encoding="utf-8"?>
 <p:notesMaster xmlns:a="http://schemas.openxmlformats.org/drawingml/2006/main" xmlns:r="http://schemas.openxmlformats.org/officeDocument/2006/relationships" xmlns:p="http://schemas.openxmlformats.org/presentationml/2006/main">
   <p:cSld>
@@ -221,7 +217,7 @@
           <a:p>
             <a:fld id="{9F94D248-1A35-44C6-8CCD-E7E8C3F9CB92}" type="datetimeFigureOut">
               <a:rPr lang="en-US" smtClean="0"/>
-              <a:t>4/8/2018</a:t>
+              <a:t>4/9/2018</a:t>
             </a:fld>
             <a:endParaRPr lang="en-US"/>
           </a:p>
@@ -6224,7 +6220,31 @@
           <a:bodyPr/>
           <a:lstStyle/>
           <a:p>
-            <a:endParaRPr lang="en-US"/>
+            <a:r>
+              <a:rPr lang="en-US" dirty="0"/>
+              <a:t>Translation in x-y with -40 – 90 : successful </a:t>
+            </a:r>
+          </a:p>
+          <a:p>
+            <a:r>
+              <a:rPr lang="en-US" dirty="0"/>
+              <a:t>Perturbations in all axes: x-axis trans: 32 y-axis trans:-80 x-axis rotation: 16 degrees. y-axis rotation: 4, z-axis rotation: -8 degrees FAILED to align in all axes of rotations </a:t>
+            </a:r>
+          </a:p>
+          <a:p>
+            <a:r>
+              <a:rPr lang="en-US" dirty="0"/>
+              <a:t> </a:t>
+            </a:r>
+          </a:p>
+          <a:p>
+            <a:pPr marL="0" indent="0">
+              <a:buNone/>
+            </a:pPr>
+            <a:endParaRPr lang="en-US" dirty="0"/>
+          </a:p>
+          <a:p>
+            <a:endParaRPr lang="en-US" dirty="0"/>
           </a:p>
         </p:txBody>
       </p:sp>
@@ -8234,8 +8254,8 @@
           </a:p>
         </p:txBody>
       </p:sp>
-      <mc:AlternateContent xmlns:mc="http://schemas.openxmlformats.org/markup-compatibility/2006">
-        <mc:Choice xmlns:a14="http://schemas.microsoft.com/office/drawing/2010/main" Requires="a14">
+      <mc:AlternateContent xmlns:mc="http://schemas.openxmlformats.org/markup-compatibility/2006" xmlns:a14="http://schemas.microsoft.com/office/drawing/2010/main">
+        <mc:Choice Requires="a14">
           <p:sp>
             <p:nvSpPr>
               <p:cNvPr id="3" name="Content Placeholder 2">
@@ -8422,7 +8442,7 @@
             </p:txBody>
           </p:sp>
         </mc:Choice>
-        <mc:Fallback>
+        <mc:Fallback xmlns="">
           <p:sp>
             <p:nvSpPr>
               <p:cNvPr id="3" name="Content Placeholder 2">

</xml_diff>